<commit_message>
Revert ".NET 6 samples"
This reverts commit 8a440e685e057de82239558066ae25cec407ef72.
</commit_message>
<xml_diff>
--- a/AsyncAngular/Slides/AsyncServerless.pptx
+++ b/AsyncAngular/Slides/AsyncServerless.pptx
@@ -208,7 +208,7 @@
           <a:p>
             <a:fld id="{E406EB93-1CA8-49A4-ACAC-8910D7DC503D}" type="datetimeFigureOut">
               <a:rPr lang="en-AT" smtClean="0"/>
-              <a:t>19/04/2021</a:t>
+              <a:t>27/10/2020</a:t>
             </a:fld>
             <a:endParaRPr lang="en-AT"/>
           </a:p>
@@ -8477,7 +8477,7 @@
           <a:p>
             <a:fld id="{AFAAA849-1D6E-40B2-B057-39C83678EF33}" type="datetimeFigureOut">
               <a:rPr lang="en-US" smtClean="0"/>
-              <a:t>4/19/2021</a:t>
+              <a:t>10/27/2020</a:t>
             </a:fld>
             <a:endParaRPr lang="en-US"/>
           </a:p>
@@ -8675,7 +8675,7 @@
           <a:p>
             <a:fld id="{AFAAA849-1D6E-40B2-B057-39C83678EF33}" type="datetimeFigureOut">
               <a:rPr lang="en-US" smtClean="0"/>
-              <a:t>4/19/2021</a:t>
+              <a:t>10/27/2020</a:t>
             </a:fld>
             <a:endParaRPr lang="en-US"/>
           </a:p>
@@ -18132,19 +18132,18 @@
             <p:ph type="body" sz="quarter" idx="24"/>
           </p:nvPr>
         </p:nvSpPr>
-        <p:spPr>
-          <a:xfrm>
-            <a:off x="818147" y="458037"/>
-            <a:ext cx="10334101" cy="914131"/>
-          </a:xfrm>
-        </p:spPr>
+        <p:spPr/>
         <p:txBody>
           <a:bodyPr/>
           <a:lstStyle/>
           <a:p>
             <a:r>
+              <a:rPr lang="de-AT" dirty="0" err="1"/>
+              <a:t>MobileTechCon</a:t>
+            </a:r>
+            <a:r>
               <a:rPr lang="de-AT" dirty="0"/>
-              <a:t>International JavaScript Conference</a:t>
+              <a:t> Conference</a:t>
             </a:r>
             <a:endParaRPr lang="en-US" dirty="0"/>
           </a:p>
@@ -18184,19 +18183,14 @@
             <p:ph type="title"/>
           </p:nvPr>
         </p:nvSpPr>
-        <p:spPr>
-          <a:xfrm>
-            <a:off x="818147" y="2795708"/>
-            <a:ext cx="5763133" cy="909307"/>
-          </a:xfrm>
-        </p:spPr>
+        <p:spPr/>
         <p:txBody>
           <a:bodyPr/>
           <a:lstStyle/>
           <a:p>
             <a:r>
               <a:rPr lang="en-US" sz="5400" dirty="0"/>
-              <a:t>Realtime Serverless</a:t>
+              <a:t>Async Serverless</a:t>
             </a:r>
           </a:p>
         </p:txBody>
@@ -18314,23 +18308,18 @@
             <p:ph type="body" sz="quarter" idx="25"/>
           </p:nvPr>
         </p:nvSpPr>
-        <p:spPr>
-          <a:xfrm>
-            <a:off x="818147" y="4297196"/>
-            <a:ext cx="5768721" cy="489601"/>
-          </a:xfrm>
-        </p:spPr>
+        <p:spPr/>
         <p:txBody>
           <a:bodyPr/>
           <a:lstStyle/>
           <a:p>
             <a:r>
-              <a:rPr lang="en-US" dirty="0"/>
-              <a:t>with Node.js, Azure Functions, and Azure </a:t>
-            </a:r>
-            <a:r>
-              <a:rPr lang="en-US" dirty="0" err="1"/>
-              <a:t>SignalR</a:t>
+              <a:rPr lang="de-AT" dirty="0" err="1"/>
+              <a:t>with</a:t>
+            </a:r>
+            <a:r>
+              <a:rPr lang="de-AT" dirty="0"/>
+              <a:t> Angular and Azure</a:t>
             </a:r>
             <a:endParaRPr lang="en-US" dirty="0"/>
           </a:p>
@@ -18371,53 +18360,6 @@
           </a:p>
         </p:txBody>
       </p:sp>
-      <p:pic>
-        <p:nvPicPr>
-          <p:cNvPr id="1026" name="Picture 2">
-            <a:extLst>
-              <a:ext uri="{FF2B5EF4-FFF2-40B4-BE49-F238E27FC236}">
-                <a16:creationId xmlns:a16="http://schemas.microsoft.com/office/drawing/2014/main" id="{8FA64A82-4A56-45D2-9CFF-23F093AD6A1F}"/>
-              </a:ext>
-            </a:extLst>
-          </p:cNvPr>
-          <p:cNvPicPr>
-            <a:picLocks noChangeAspect="1" noChangeArrowheads="1"/>
-          </p:cNvPicPr>
-          <p:nvPr/>
-        </p:nvPicPr>
-        <p:blipFill>
-          <a:blip r:embed="rId5">
-            <a:extLst>
-              <a:ext uri="{28A0092B-C50C-407E-A947-70E740481C1C}">
-                <a14:useLocalDpi xmlns:a14="http://schemas.microsoft.com/office/drawing/2010/main" val="0"/>
-              </a:ext>
-            </a:extLst>
-          </a:blip>
-          <a:srcRect/>
-          <a:stretch>
-            <a:fillRect/>
-          </a:stretch>
-        </p:blipFill>
-        <p:spPr bwMode="auto">
-          <a:xfrm>
-            <a:off x="4559717" y="790269"/>
-            <a:ext cx="1323975" cy="542925"/>
-          </a:xfrm>
-          <a:prstGeom prst="rect">
-            <a:avLst/>
-          </a:prstGeom>
-          <a:noFill/>
-          <a:extLst>
-            <a:ext uri="{909E8E84-426E-40DD-AFC4-6F175D3DCCD1}">
-              <a14:hiddenFill xmlns:a14="http://schemas.microsoft.com/office/drawing/2010/main">
-                <a:solidFill>
-                  <a:srgbClr val="FFFFFF"/>
-                </a:solidFill>
-              </a14:hiddenFill>
-            </a:ext>
-          </a:extLst>
-        </p:spPr>
-      </p:pic>
     </p:spTree>
     <p:extLst>
       <p:ext uri="{BB962C8B-B14F-4D97-AF65-F5344CB8AC3E}">
@@ -19319,7 +19261,7 @@
         </p:nvSpPr>
         <p:spPr>
           <a:xfrm>
-            <a:off x="856141" y="452967"/>
+            <a:off x="1521884" y="452967"/>
             <a:ext cx="10335683" cy="914400"/>
           </a:xfrm>
         </p:spPr>
@@ -19328,8 +19270,12 @@
           <a:lstStyle/>
           <a:p>
             <a:r>
+              <a:rPr lang="de-AT" dirty="0" err="1"/>
+              <a:t>MobileTechCon</a:t>
+            </a:r>
+            <a:r>
               <a:rPr lang="de-AT" dirty="0"/>
-              <a:t>International JavaScript Conference</a:t>
+              <a:t> Conference</a:t>
             </a:r>
             <a:endParaRPr lang="en-US" dirty="0"/>
           </a:p>
@@ -19369,12 +19315,7 @@
             <p:ph type="title"/>
           </p:nvPr>
         </p:nvSpPr>
-        <p:spPr>
-          <a:xfrm>
-            <a:off x="859591" y="3261019"/>
-            <a:ext cx="5047925" cy="909307"/>
-          </a:xfrm>
-        </p:spPr>
+        <p:spPr/>
         <p:txBody>
           <a:bodyPr/>
           <a:lstStyle/>
@@ -19478,7 +19419,7 @@
         </p:nvSpPr>
         <p:spPr>
           <a:xfrm>
-            <a:off x="860374" y="4180418"/>
+            <a:off x="1526117" y="4180418"/>
             <a:ext cx="5052483" cy="488949"/>
           </a:xfrm>
         </p:spPr>
@@ -19534,53 +19475,6 @@
           </a:p>
         </p:txBody>
       </p:sp>
-      <p:pic>
-        <p:nvPicPr>
-          <p:cNvPr id="11" name="Picture 2">
-            <a:extLst>
-              <a:ext uri="{FF2B5EF4-FFF2-40B4-BE49-F238E27FC236}">
-                <a16:creationId xmlns:a16="http://schemas.microsoft.com/office/drawing/2014/main" id="{C73F2492-F78E-4301-BBE0-4EA4670E0DA6}"/>
-              </a:ext>
-            </a:extLst>
-          </p:cNvPr>
-          <p:cNvPicPr>
-            <a:picLocks noChangeAspect="1" noChangeArrowheads="1"/>
-          </p:cNvPicPr>
-          <p:nvPr/>
-        </p:nvPicPr>
-        <p:blipFill>
-          <a:blip r:embed="rId3">
-            <a:extLst>
-              <a:ext uri="{28A0092B-C50C-407E-A947-70E740481C1C}">
-                <a14:useLocalDpi xmlns:a14="http://schemas.microsoft.com/office/drawing/2010/main" val="0"/>
-              </a:ext>
-            </a:extLst>
-          </a:blip>
-          <a:srcRect/>
-          <a:stretch>
-            <a:fillRect/>
-          </a:stretch>
-        </p:blipFill>
-        <p:spPr bwMode="auto">
-          <a:xfrm>
-            <a:off x="4559717" y="790269"/>
-            <a:ext cx="1323975" cy="542925"/>
-          </a:xfrm>
-          <a:prstGeom prst="rect">
-            <a:avLst/>
-          </a:prstGeom>
-          <a:noFill/>
-          <a:extLst>
-            <a:ext uri="{909E8E84-426E-40DD-AFC4-6F175D3DCCD1}">
-              <a14:hiddenFill xmlns:a14="http://schemas.microsoft.com/office/drawing/2010/main">
-                <a:solidFill>
-                  <a:srgbClr val="FFFFFF"/>
-                </a:solidFill>
-              </a14:hiddenFill>
-            </a:ext>
-          </a:extLst>
-        </p:spPr>
-      </p:pic>
     </p:spTree>
     <p:extLst>
       <p:ext uri="{BB962C8B-B14F-4D97-AF65-F5344CB8AC3E}">

</xml_diff>